<commit_message>
graph plots of rev2data
</commit_message>
<xml_diff>
--- a/Data/Presentation.pptx
+++ b/Data/Presentation.pptx
@@ -8,6 +8,22 @@
     <p:sldId id="256" r:id="rId2"/>
     <p:sldId id="257" r:id="rId3"/>
     <p:sldId id="258" r:id="rId4"/>
+    <p:sldId id="259" r:id="rId5"/>
+    <p:sldId id="260" r:id="rId6"/>
+    <p:sldId id="261" r:id="rId7"/>
+    <p:sldId id="262" r:id="rId8"/>
+    <p:sldId id="263" r:id="rId9"/>
+    <p:sldId id="264" r:id="rId10"/>
+    <p:sldId id="265" r:id="rId11"/>
+    <p:sldId id="266" r:id="rId12"/>
+    <p:sldId id="267" r:id="rId13"/>
+    <p:sldId id="268" r:id="rId14"/>
+    <p:sldId id="269" r:id="rId15"/>
+    <p:sldId id="270" r:id="rId16"/>
+    <p:sldId id="271" r:id="rId17"/>
+    <p:sldId id="272" r:id="rId18"/>
+    <p:sldId id="273" r:id="rId19"/>
+    <p:sldId id="274" r:id="rId20"/>
   </p:sldIdLst>
   <p:sldSz cx="12192000" cy="6858000"/>
   <p:notesSz cx="6858000" cy="9144000"/>
@@ -108,7 +124,7 @@
   </p:defaultTextStyle>
   <p:extLst>
     <p:ext uri="{EFAFB233-063F-42B5-8137-9DF3F51BA10A}">
-      <p15:sldGuideLst xmlns="" xmlns:p15="http://schemas.microsoft.com/office/powerpoint/2012/main"/>
+      <p15:sldGuideLst xmlns:p15="http://schemas.microsoft.com/office/powerpoint/2012/main" xmlns=""/>
     </p:ext>
   </p:extLst>
 </p:presentation>
@@ -287,7 +303,7 @@
             <a:fld id="{1160EA64-D806-43AC-9DF2-F8C432F32B4C}" type="datetimeFigureOut">
               <a:rPr lang="en-US" dirty="0"/>
               <a:pPr/>
-              <a:t>12/9/2020</a:t>
+              <a:t>12/11/2020</a:t>
             </a:fld>
             <a:endParaRPr lang="en-US" dirty="0"/>
           </a:p>
@@ -454,7 +470,7 @@
             <a:fld id="{E9F9C37B-1D36-470B-8223-D6C91242EC14}" type="datetimeFigureOut">
               <a:rPr lang="en-US" dirty="0"/>
               <a:pPr/>
-              <a:t>12/9/2020</a:t>
+              <a:t>12/11/2020</a:t>
             </a:fld>
             <a:endParaRPr lang="en-US" dirty="0"/>
           </a:p>
@@ -631,7 +647,7 @@
             <a:fld id="{67C6F52A-A82B-47A2-A83A-8C4C91F2D59F}" type="datetimeFigureOut">
               <a:rPr lang="en-US" dirty="0"/>
               <a:pPr/>
-              <a:t>12/9/2020</a:t>
+              <a:t>12/11/2020</a:t>
             </a:fld>
             <a:endParaRPr lang="en-US" dirty="0"/>
           </a:p>
@@ -798,7 +814,7 @@
             <a:fld id="{F070A7B3-6521-4DCA-87E5-044747A908C1}" type="datetimeFigureOut">
               <a:rPr lang="en-US" dirty="0"/>
               <a:pPr/>
-              <a:t>12/9/2020</a:t>
+              <a:t>12/11/2020</a:t>
             </a:fld>
             <a:endParaRPr lang="en-US" dirty="0"/>
           </a:p>
@@ -1063,7 +1079,7 @@
             <a:fld id="{1160EA64-D806-43AC-9DF2-F8C432F32B4C}" type="datetimeFigureOut">
               <a:rPr lang="en-US" dirty="0"/>
               <a:pPr/>
-              <a:t>12/9/2020</a:t>
+              <a:t>12/11/2020</a:t>
             </a:fld>
             <a:endParaRPr lang="en-US" dirty="0"/>
           </a:p>
@@ -1292,7 +1308,7 @@
             <a:fld id="{AB134690-1557-4C89-A502-4959FE7FAD70}" type="datetimeFigureOut">
               <a:rPr lang="en-US" dirty="0"/>
               <a:pPr/>
-              <a:t>12/9/2020</a:t>
+              <a:t>12/11/2020</a:t>
             </a:fld>
             <a:endParaRPr lang="en-US" dirty="0"/>
           </a:p>
@@ -1648,7 +1664,7 @@
             <a:fld id="{4F7D4976-E339-4826-83B7-FBD03F55ECF8}" type="datetimeFigureOut">
               <a:rPr lang="en-US" dirty="0"/>
               <a:pPr/>
-              <a:t>12/9/2020</a:t>
+              <a:t>12/11/2020</a:t>
             </a:fld>
             <a:endParaRPr lang="en-US" dirty="0"/>
           </a:p>
@@ -1786,7 +1802,7 @@
             <a:fld id="{E1037C31-9E7A-4F99-8774-A0E530DE1A42}" type="datetimeFigureOut">
               <a:rPr lang="en-US" dirty="0"/>
               <a:pPr/>
-              <a:t>12/9/2020</a:t>
+              <a:t>12/11/2020</a:t>
             </a:fld>
             <a:endParaRPr lang="en-US" dirty="0"/>
           </a:p>
@@ -1878,7 +1894,7 @@
             <a:fld id="{C278504F-A551-4DE0-9316-4DCD1D8CC752}" type="datetimeFigureOut">
               <a:rPr lang="en-US" dirty="0"/>
               <a:pPr/>
-              <a:t>12/9/2020</a:t>
+              <a:t>12/11/2020</a:t>
             </a:fld>
             <a:endParaRPr lang="en-US" dirty="0"/>
           </a:p>
@@ -2232,7 +2248,7 @@
             <a:fld id="{D1BE4249-C0D0-4B06-8692-E8BB871AF643}" type="datetimeFigureOut">
               <a:rPr lang="en-US" dirty="0"/>
               <a:pPr/>
-              <a:t>12/9/2020</a:t>
+              <a:t>12/11/2020</a:t>
             </a:fld>
             <a:endParaRPr lang="en-US" dirty="0"/>
           </a:p>
@@ -2586,7 +2602,7 @@
             <a:fld id="{042B0DB6-F5C7-45FB-8CF3-31B45F9C2DAC}" type="datetimeFigureOut">
               <a:rPr lang="en-US" dirty="0"/>
               <a:pPr/>
-              <a:t>12/9/2020</a:t>
+              <a:t>12/11/2020</a:t>
             </a:fld>
             <a:endParaRPr lang="en-US" dirty="0"/>
           </a:p>
@@ -2824,7 +2840,7 @@
             <a:fld id="{1160EA64-D806-43AC-9DF2-F8C432F32B4C}" type="datetimeFigureOut">
               <a:rPr lang="en-US" dirty="0"/>
               <a:pPr/>
-              <a:t>12/9/2020</a:t>
+              <a:t>12/11/2020</a:t>
             </a:fld>
             <a:endParaRPr lang="en-US" dirty="0"/>
           </a:p>
@@ -3330,9 +3346,873 @@
     </p:spTree>
     <p:extLst>
       <p:ext uri="{BB962C8B-B14F-4D97-AF65-F5344CB8AC3E}">
-        <p14:creationId xmlns="" xmlns:p14="http://schemas.microsoft.com/office/powerpoint/2010/main" val="1194440229"/>
+        <p14:creationId xmlns:p14="http://schemas.microsoft.com/office/powerpoint/2010/main" xmlns="" val="1194440229"/>
       </p:ext>
     </p:extLst>
+  </p:cSld>
+  <p:clrMapOvr>
+    <a:masterClrMapping/>
+  </p:clrMapOvr>
+</p:sld>
+</file>
+
+<file path=ppt/slides/slide10.xml><?xml version="1.0" encoding="utf-8"?>
+<p:sld xmlns:a="http://schemas.openxmlformats.org/drawingml/2006/main" xmlns:r="http://schemas.openxmlformats.org/officeDocument/2006/relationships" xmlns:p="http://schemas.openxmlformats.org/presentationml/2006/main">
+  <p:cSld>
+    <p:spTree>
+      <p:nvGrpSpPr>
+        <p:cNvPr id="1" name=""/>
+        <p:cNvGrpSpPr/>
+        <p:nvPr/>
+      </p:nvGrpSpPr>
+      <p:grpSpPr>
+        <a:xfrm>
+          <a:off x="0" y="0"/>
+          <a:ext cx="0" cy="0"/>
+          <a:chOff x="0" y="0"/>
+          <a:chExt cx="0" cy="0"/>
+        </a:xfrm>
+      </p:grpSpPr>
+      <p:pic>
+        <p:nvPicPr>
+          <p:cNvPr id="2" name="Picture 1" descr="otc_num_src_filtered.png"/>
+          <p:cNvPicPr>
+            <a:picLocks noChangeAspect="1"/>
+          </p:cNvPicPr>
+          <p:nvPr/>
+        </p:nvPicPr>
+        <p:blipFill>
+          <a:blip r:embed="rId2"/>
+          <a:stretch>
+            <a:fillRect/>
+          </a:stretch>
+        </p:blipFill>
+        <p:spPr>
+          <a:xfrm>
+            <a:off x="2244696" y="-1"/>
+            <a:ext cx="8153338" cy="5119059"/>
+          </a:xfrm>
+          <a:prstGeom prst="rect">
+            <a:avLst/>
+          </a:prstGeom>
+        </p:spPr>
+      </p:pic>
+      <p:sp>
+        <p:nvSpPr>
+          <p:cNvPr id="3" name="TextBox 2"/>
+          <p:cNvSpPr txBox="1"/>
+          <p:nvPr/>
+        </p:nvSpPr>
+        <p:spPr>
+          <a:xfrm>
+            <a:off x="2468880" y="5708469"/>
+            <a:ext cx="8125097" cy="369332"/>
+          </a:xfrm>
+          <a:prstGeom prst="rect">
+            <a:avLst/>
+          </a:prstGeom>
+          <a:noFill/>
+        </p:spPr>
+        <p:txBody>
+          <a:bodyPr wrap="square" rtlCol="0">
+            <a:spAutoFit/>
+          </a:bodyPr>
+          <a:lstStyle/>
+          <a:p>
+            <a:pPr algn="ctr"/>
+            <a:r>
+              <a:rPr lang="en-US" dirty="0" smtClean="0"/>
+              <a:t>OTC _NUM OF </a:t>
+            </a:r>
+            <a:r>
+              <a:rPr lang="en-US" dirty="0" smtClean="0"/>
+              <a:t>SRC </a:t>
+            </a:r>
+            <a:r>
+              <a:rPr lang="en-US" dirty="0" smtClean="0"/>
+              <a:t>FILTERED FROM GT</a:t>
+            </a:r>
+            <a:endParaRPr lang="en-US" dirty="0"/>
+          </a:p>
+        </p:txBody>
+      </p:sp>
+    </p:spTree>
+  </p:cSld>
+  <p:clrMapOvr>
+    <a:masterClrMapping/>
+  </p:clrMapOvr>
+</p:sld>
+</file>
+
+<file path=ppt/slides/slide11.xml><?xml version="1.0" encoding="utf-8"?>
+<p:sld xmlns:a="http://schemas.openxmlformats.org/drawingml/2006/main" xmlns:r="http://schemas.openxmlformats.org/officeDocument/2006/relationships" xmlns:p="http://schemas.openxmlformats.org/presentationml/2006/main">
+  <p:cSld>
+    <p:spTree>
+      <p:nvGrpSpPr>
+        <p:cNvPr id="1" name=""/>
+        <p:cNvGrpSpPr/>
+        <p:nvPr/>
+      </p:nvGrpSpPr>
+      <p:grpSpPr>
+        <a:xfrm>
+          <a:off x="0" y="0"/>
+          <a:ext cx="0" cy="0"/>
+          <a:chOff x="0" y="0"/>
+          <a:chExt cx="0" cy="0"/>
+        </a:xfrm>
+      </p:grpSpPr>
+      <p:pic>
+        <p:nvPicPr>
+          <p:cNvPr id="2" name="Picture 1" descr="otc_num_dest_filtered.png"/>
+          <p:cNvPicPr>
+            <a:picLocks noChangeAspect="1"/>
+          </p:cNvPicPr>
+          <p:nvPr/>
+        </p:nvPicPr>
+        <p:blipFill>
+          <a:blip r:embed="rId2"/>
+          <a:stretch>
+            <a:fillRect/>
+          </a:stretch>
+        </p:blipFill>
+        <p:spPr>
+          <a:xfrm>
+            <a:off x="2063932" y="0"/>
+            <a:ext cx="7981405" cy="4908599"/>
+          </a:xfrm>
+          <a:prstGeom prst="rect">
+            <a:avLst/>
+          </a:prstGeom>
+        </p:spPr>
+      </p:pic>
+      <p:sp>
+        <p:nvSpPr>
+          <p:cNvPr id="4" name="TextBox 3"/>
+          <p:cNvSpPr txBox="1"/>
+          <p:nvPr/>
+        </p:nvSpPr>
+        <p:spPr>
+          <a:xfrm>
+            <a:off x="1894114" y="5747657"/>
+            <a:ext cx="8020594" cy="369332"/>
+          </a:xfrm>
+          <a:prstGeom prst="rect">
+            <a:avLst/>
+          </a:prstGeom>
+          <a:noFill/>
+        </p:spPr>
+        <p:txBody>
+          <a:bodyPr wrap="square" rtlCol="0">
+            <a:spAutoFit/>
+          </a:bodyPr>
+          <a:lstStyle/>
+          <a:p>
+            <a:pPr algn="ctr"/>
+            <a:r>
+              <a:rPr lang="en-US" dirty="0" smtClean="0"/>
+              <a:t>OTC </a:t>
+            </a:r>
+            <a:r>
+              <a:rPr lang="en-US" dirty="0" smtClean="0"/>
+              <a:t>_NUM OF DEST FILTERED FROM GT</a:t>
+            </a:r>
+            <a:endParaRPr lang="en-US" dirty="0"/>
+          </a:p>
+        </p:txBody>
+      </p:sp>
+    </p:spTree>
+  </p:cSld>
+  <p:clrMapOvr>
+    <a:masterClrMapping/>
+  </p:clrMapOvr>
+</p:sld>
+</file>
+
+<file path=ppt/slides/slide12.xml><?xml version="1.0" encoding="utf-8"?>
+<p:sld xmlns:a="http://schemas.openxmlformats.org/drawingml/2006/main" xmlns:r="http://schemas.openxmlformats.org/officeDocument/2006/relationships" xmlns:p="http://schemas.openxmlformats.org/presentationml/2006/main">
+  <p:cSld>
+    <p:spTree>
+      <p:nvGrpSpPr>
+        <p:cNvPr id="1" name=""/>
+        <p:cNvGrpSpPr/>
+        <p:nvPr/>
+      </p:nvGrpSpPr>
+      <p:grpSpPr>
+        <a:xfrm>
+          <a:off x="0" y="0"/>
+          <a:ext cx="0" cy="0"/>
+          <a:chOff x="0" y="0"/>
+          <a:chExt cx="0" cy="0"/>
+        </a:xfrm>
+      </p:grpSpPr>
+      <p:pic>
+        <p:nvPicPr>
+          <p:cNvPr id="2" name="Picture 1" descr="amazon_num_src.png"/>
+          <p:cNvPicPr>
+            <a:picLocks noChangeAspect="1"/>
+          </p:cNvPicPr>
+          <p:nvPr/>
+        </p:nvPicPr>
+        <p:blipFill>
+          <a:blip r:embed="rId2"/>
+          <a:stretch>
+            <a:fillRect/>
+          </a:stretch>
+        </p:blipFill>
+        <p:spPr>
+          <a:xfrm>
+            <a:off x="2170033" y="0"/>
+            <a:ext cx="8450070" cy="4949298"/>
+          </a:xfrm>
+          <a:prstGeom prst="rect">
+            <a:avLst/>
+          </a:prstGeom>
+        </p:spPr>
+      </p:pic>
+      <p:sp>
+        <p:nvSpPr>
+          <p:cNvPr id="3" name="TextBox 2"/>
+          <p:cNvSpPr txBox="1"/>
+          <p:nvPr/>
+        </p:nvSpPr>
+        <p:spPr>
+          <a:xfrm>
+            <a:off x="1998617" y="5630091"/>
+            <a:ext cx="8451669" cy="369332"/>
+          </a:xfrm>
+          <a:prstGeom prst="rect">
+            <a:avLst/>
+          </a:prstGeom>
+          <a:noFill/>
+        </p:spPr>
+        <p:txBody>
+          <a:bodyPr wrap="square" rtlCol="0">
+            <a:spAutoFit/>
+          </a:bodyPr>
+          <a:lstStyle/>
+          <a:p>
+            <a:pPr algn="ctr"/>
+            <a:r>
+              <a:rPr lang="en-US" dirty="0" smtClean="0"/>
+              <a:t>AMAZON_NUM </a:t>
+            </a:r>
+            <a:r>
+              <a:rPr lang="en-US" dirty="0" smtClean="0"/>
+              <a:t>OF </a:t>
+            </a:r>
+            <a:r>
+              <a:rPr lang="en-US" dirty="0" smtClean="0"/>
+              <a:t>SRC</a:t>
+            </a:r>
+            <a:endParaRPr lang="en-US" dirty="0"/>
+          </a:p>
+        </p:txBody>
+      </p:sp>
+    </p:spTree>
+  </p:cSld>
+  <p:clrMapOvr>
+    <a:masterClrMapping/>
+  </p:clrMapOvr>
+</p:sld>
+</file>
+
+<file path=ppt/slides/slide13.xml><?xml version="1.0" encoding="utf-8"?>
+<p:sld xmlns:a="http://schemas.openxmlformats.org/drawingml/2006/main" xmlns:r="http://schemas.openxmlformats.org/officeDocument/2006/relationships" xmlns:p="http://schemas.openxmlformats.org/presentationml/2006/main">
+  <p:cSld>
+    <p:spTree>
+      <p:nvGrpSpPr>
+        <p:cNvPr id="1" name=""/>
+        <p:cNvGrpSpPr/>
+        <p:nvPr/>
+      </p:nvGrpSpPr>
+      <p:grpSpPr>
+        <a:xfrm>
+          <a:off x="0" y="0"/>
+          <a:ext cx="0" cy="0"/>
+          <a:chOff x="0" y="0"/>
+          <a:chExt cx="0" cy="0"/>
+        </a:xfrm>
+      </p:grpSpPr>
+      <p:pic>
+        <p:nvPicPr>
+          <p:cNvPr id="2" name="Picture 1" descr="amazon_num_dest.png"/>
+          <p:cNvPicPr>
+            <a:picLocks noChangeAspect="1"/>
+          </p:cNvPicPr>
+          <p:nvPr/>
+        </p:nvPicPr>
+        <p:blipFill>
+          <a:blip r:embed="rId2"/>
+          <a:stretch>
+            <a:fillRect/>
+          </a:stretch>
+        </p:blipFill>
+        <p:spPr>
+          <a:xfrm>
+            <a:off x="2194560" y="-137747"/>
+            <a:ext cx="8268789" cy="5312590"/>
+          </a:xfrm>
+          <a:prstGeom prst="rect">
+            <a:avLst/>
+          </a:prstGeom>
+        </p:spPr>
+      </p:pic>
+      <p:sp>
+        <p:nvSpPr>
+          <p:cNvPr id="3" name="TextBox 2"/>
+          <p:cNvSpPr txBox="1"/>
+          <p:nvPr/>
+        </p:nvSpPr>
+        <p:spPr>
+          <a:xfrm>
+            <a:off x="1894114" y="5695406"/>
+            <a:ext cx="8765177" cy="369332"/>
+          </a:xfrm>
+          <a:prstGeom prst="rect">
+            <a:avLst/>
+          </a:prstGeom>
+          <a:noFill/>
+        </p:spPr>
+        <p:txBody>
+          <a:bodyPr wrap="square" rtlCol="0">
+            <a:spAutoFit/>
+          </a:bodyPr>
+          <a:lstStyle/>
+          <a:p>
+            <a:pPr algn="ctr"/>
+            <a:r>
+              <a:rPr lang="en-US" dirty="0" smtClean="0"/>
+              <a:t>AMAZON </a:t>
+            </a:r>
+            <a:r>
+              <a:rPr lang="en-US" dirty="0" smtClean="0"/>
+              <a:t>_NUM OF </a:t>
+            </a:r>
+            <a:r>
+              <a:rPr lang="en-US" dirty="0" smtClean="0"/>
+              <a:t>DEST</a:t>
+            </a:r>
+            <a:endParaRPr lang="en-US" dirty="0"/>
+          </a:p>
+        </p:txBody>
+      </p:sp>
+    </p:spTree>
+  </p:cSld>
+  <p:clrMapOvr>
+    <a:masterClrMapping/>
+  </p:clrMapOvr>
+</p:sld>
+</file>
+
+<file path=ppt/slides/slide14.xml><?xml version="1.0" encoding="utf-8"?>
+<p:sld xmlns:a="http://schemas.openxmlformats.org/drawingml/2006/main" xmlns:r="http://schemas.openxmlformats.org/officeDocument/2006/relationships" xmlns:p="http://schemas.openxmlformats.org/presentationml/2006/main">
+  <p:cSld>
+    <p:spTree>
+      <p:nvGrpSpPr>
+        <p:cNvPr id="1" name=""/>
+        <p:cNvGrpSpPr/>
+        <p:nvPr/>
+      </p:nvGrpSpPr>
+      <p:grpSpPr>
+        <a:xfrm>
+          <a:off x="0" y="0"/>
+          <a:ext cx="0" cy="0"/>
+          <a:chOff x="0" y="0"/>
+          <a:chExt cx="0" cy="0"/>
+        </a:xfrm>
+      </p:grpSpPr>
+      <p:pic>
+        <p:nvPicPr>
+          <p:cNvPr id="2" name="Picture 1" descr="amazon_num_src_filtered.png"/>
+          <p:cNvPicPr>
+            <a:picLocks noChangeAspect="1"/>
+          </p:cNvPicPr>
+          <p:nvPr/>
+        </p:nvPicPr>
+        <p:blipFill>
+          <a:blip r:embed="rId2"/>
+          <a:stretch>
+            <a:fillRect/>
+          </a:stretch>
+        </p:blipFill>
+        <p:spPr>
+          <a:xfrm>
+            <a:off x="1829468" y="0"/>
+            <a:ext cx="7654165" cy="4917702"/>
+          </a:xfrm>
+          <a:prstGeom prst="rect">
+            <a:avLst/>
+          </a:prstGeom>
+        </p:spPr>
+      </p:pic>
+      <p:sp>
+        <p:nvSpPr>
+          <p:cNvPr id="3" name="TextBox 2"/>
+          <p:cNvSpPr txBox="1"/>
+          <p:nvPr/>
+        </p:nvSpPr>
+        <p:spPr>
+          <a:xfrm>
+            <a:off x="1685109" y="5747657"/>
+            <a:ext cx="8425542" cy="369332"/>
+          </a:xfrm>
+          <a:prstGeom prst="rect">
+            <a:avLst/>
+          </a:prstGeom>
+          <a:noFill/>
+        </p:spPr>
+        <p:txBody>
+          <a:bodyPr wrap="square" rtlCol="0">
+            <a:spAutoFit/>
+          </a:bodyPr>
+          <a:lstStyle/>
+          <a:p>
+            <a:pPr algn="ctr"/>
+            <a:r>
+              <a:rPr lang="en-US" dirty="0" smtClean="0"/>
+              <a:t>AMAZON_NUM </a:t>
+            </a:r>
+            <a:r>
+              <a:rPr lang="en-US" dirty="0" smtClean="0"/>
+              <a:t>OF </a:t>
+            </a:r>
+            <a:r>
+              <a:rPr lang="en-US" dirty="0" smtClean="0"/>
+              <a:t>SRC </a:t>
+            </a:r>
+            <a:r>
+              <a:rPr lang="en-US" dirty="0" smtClean="0"/>
+              <a:t>FILTERED FROM GT</a:t>
+            </a:r>
+            <a:endParaRPr lang="en-US" dirty="0"/>
+          </a:p>
+        </p:txBody>
+      </p:sp>
+    </p:spTree>
+  </p:cSld>
+  <p:clrMapOvr>
+    <a:masterClrMapping/>
+  </p:clrMapOvr>
+</p:sld>
+</file>
+
+<file path=ppt/slides/slide15.xml><?xml version="1.0" encoding="utf-8"?>
+<p:sld xmlns:a="http://schemas.openxmlformats.org/drawingml/2006/main" xmlns:r="http://schemas.openxmlformats.org/officeDocument/2006/relationships" xmlns:p="http://schemas.openxmlformats.org/presentationml/2006/main">
+  <p:cSld>
+    <p:spTree>
+      <p:nvGrpSpPr>
+        <p:cNvPr id="1" name=""/>
+        <p:cNvGrpSpPr/>
+        <p:nvPr/>
+      </p:nvGrpSpPr>
+      <p:grpSpPr>
+        <a:xfrm>
+          <a:off x="0" y="0"/>
+          <a:ext cx="0" cy="0"/>
+          <a:chOff x="0" y="0"/>
+          <a:chExt cx="0" cy="0"/>
+        </a:xfrm>
+      </p:grpSpPr>
+      <p:pic>
+        <p:nvPicPr>
+          <p:cNvPr id="2" name="Picture 1" descr="amazon_num_dest_filtered.png"/>
+          <p:cNvPicPr>
+            <a:picLocks noChangeAspect="1"/>
+          </p:cNvPicPr>
+          <p:nvPr/>
+        </p:nvPicPr>
+        <p:blipFill>
+          <a:blip r:embed="rId2"/>
+          <a:stretch>
+            <a:fillRect/>
+          </a:stretch>
+        </p:blipFill>
+        <p:spPr>
+          <a:xfrm>
+            <a:off x="1541417" y="0"/>
+            <a:ext cx="7934543" cy="5097841"/>
+          </a:xfrm>
+          <a:prstGeom prst="rect">
+            <a:avLst/>
+          </a:prstGeom>
+        </p:spPr>
+      </p:pic>
+      <p:sp>
+        <p:nvSpPr>
+          <p:cNvPr id="3" name="TextBox 2"/>
+          <p:cNvSpPr txBox="1"/>
+          <p:nvPr/>
+        </p:nvSpPr>
+        <p:spPr>
+          <a:xfrm>
+            <a:off x="1371600" y="5434149"/>
+            <a:ext cx="8307977" cy="369332"/>
+          </a:xfrm>
+          <a:prstGeom prst="rect">
+            <a:avLst/>
+          </a:prstGeom>
+          <a:noFill/>
+        </p:spPr>
+        <p:txBody>
+          <a:bodyPr wrap="square" rtlCol="0">
+            <a:spAutoFit/>
+          </a:bodyPr>
+          <a:lstStyle/>
+          <a:p>
+            <a:pPr algn="ctr"/>
+            <a:r>
+              <a:rPr lang="en-US" dirty="0" smtClean="0"/>
+              <a:t>AMAZON_NUM </a:t>
+            </a:r>
+            <a:r>
+              <a:rPr lang="en-US" dirty="0" smtClean="0"/>
+              <a:t>OF DEST FILTERED FROM </a:t>
+            </a:r>
+            <a:r>
+              <a:rPr lang="en-US" dirty="0" smtClean="0"/>
+              <a:t>GT</a:t>
+            </a:r>
+            <a:endParaRPr lang="en-US" dirty="0" smtClean="0"/>
+          </a:p>
+        </p:txBody>
+      </p:sp>
+    </p:spTree>
+  </p:cSld>
+  <p:clrMapOvr>
+    <a:masterClrMapping/>
+  </p:clrMapOvr>
+</p:sld>
+</file>
+
+<file path=ppt/slides/slide16.xml><?xml version="1.0" encoding="utf-8"?>
+<p:sld xmlns:a="http://schemas.openxmlformats.org/drawingml/2006/main" xmlns:r="http://schemas.openxmlformats.org/officeDocument/2006/relationships" xmlns:p="http://schemas.openxmlformats.org/presentationml/2006/main">
+  <p:cSld>
+    <p:spTree>
+      <p:nvGrpSpPr>
+        <p:cNvPr id="1" name=""/>
+        <p:cNvGrpSpPr/>
+        <p:nvPr/>
+      </p:nvGrpSpPr>
+      <p:grpSpPr>
+        <a:xfrm>
+          <a:off x="0" y="0"/>
+          <a:ext cx="0" cy="0"/>
+          <a:chOff x="0" y="0"/>
+          <a:chExt cx="0" cy="0"/>
+        </a:xfrm>
+      </p:grpSpPr>
+      <p:pic>
+        <p:nvPicPr>
+          <p:cNvPr id="2" name="Picture 1" descr="epinions_num_src.png"/>
+          <p:cNvPicPr>
+            <a:picLocks noChangeAspect="1"/>
+          </p:cNvPicPr>
+          <p:nvPr/>
+        </p:nvPicPr>
+        <p:blipFill>
+          <a:blip r:embed="rId2"/>
+          <a:stretch>
+            <a:fillRect/>
+          </a:stretch>
+        </p:blipFill>
+        <p:spPr>
+          <a:xfrm>
+            <a:off x="2011679" y="-23904"/>
+            <a:ext cx="8948057" cy="5211878"/>
+          </a:xfrm>
+          <a:prstGeom prst="rect">
+            <a:avLst/>
+          </a:prstGeom>
+        </p:spPr>
+      </p:pic>
+      <p:sp>
+        <p:nvSpPr>
+          <p:cNvPr id="3" name="TextBox 2"/>
+          <p:cNvSpPr txBox="1"/>
+          <p:nvPr/>
+        </p:nvSpPr>
+        <p:spPr>
+          <a:xfrm>
+            <a:off x="2599509" y="5969726"/>
+            <a:ext cx="8281851" cy="369332"/>
+          </a:xfrm>
+          <a:prstGeom prst="rect">
+            <a:avLst/>
+          </a:prstGeom>
+          <a:noFill/>
+        </p:spPr>
+        <p:txBody>
+          <a:bodyPr wrap="square" rtlCol="0">
+            <a:spAutoFit/>
+          </a:bodyPr>
+          <a:lstStyle/>
+          <a:p>
+            <a:pPr algn="ctr"/>
+            <a:r>
+              <a:rPr lang="en-US" dirty="0" smtClean="0"/>
+              <a:t>EPINIONS _NUM OF </a:t>
+            </a:r>
+            <a:r>
+              <a:rPr lang="en-US" dirty="0" smtClean="0"/>
+              <a:t>SRC</a:t>
+            </a:r>
+            <a:endParaRPr lang="en-US" dirty="0"/>
+          </a:p>
+        </p:txBody>
+      </p:sp>
+    </p:spTree>
+  </p:cSld>
+  <p:clrMapOvr>
+    <a:masterClrMapping/>
+  </p:clrMapOvr>
+</p:sld>
+</file>
+
+<file path=ppt/slides/slide17.xml><?xml version="1.0" encoding="utf-8"?>
+<p:sld xmlns:a="http://schemas.openxmlformats.org/drawingml/2006/main" xmlns:r="http://schemas.openxmlformats.org/officeDocument/2006/relationships" xmlns:p="http://schemas.openxmlformats.org/presentationml/2006/main">
+  <p:cSld>
+    <p:spTree>
+      <p:nvGrpSpPr>
+        <p:cNvPr id="1" name=""/>
+        <p:cNvGrpSpPr/>
+        <p:nvPr/>
+      </p:nvGrpSpPr>
+      <p:grpSpPr>
+        <a:xfrm>
+          <a:off x="0" y="0"/>
+          <a:ext cx="0" cy="0"/>
+          <a:chOff x="0" y="0"/>
+          <a:chExt cx="0" cy="0"/>
+        </a:xfrm>
+      </p:grpSpPr>
+      <p:pic>
+        <p:nvPicPr>
+          <p:cNvPr id="2" name="Picture 1" descr="epinions_num_dest.png"/>
+          <p:cNvPicPr>
+            <a:picLocks noChangeAspect="1"/>
+          </p:cNvPicPr>
+          <p:nvPr/>
+        </p:nvPicPr>
+        <p:blipFill>
+          <a:blip r:embed="rId2"/>
+          <a:stretch>
+            <a:fillRect/>
+          </a:stretch>
+        </p:blipFill>
+        <p:spPr>
+          <a:xfrm>
+            <a:off x="1959428" y="-85359"/>
+            <a:ext cx="8843555" cy="5161520"/>
+          </a:xfrm>
+          <a:prstGeom prst="rect">
+            <a:avLst/>
+          </a:prstGeom>
+        </p:spPr>
+      </p:pic>
+      <p:sp>
+        <p:nvSpPr>
+          <p:cNvPr id="3" name="TextBox 2"/>
+          <p:cNvSpPr txBox="1"/>
+          <p:nvPr/>
+        </p:nvSpPr>
+        <p:spPr>
+          <a:xfrm>
+            <a:off x="1881051" y="5891349"/>
+            <a:ext cx="8974183" cy="369332"/>
+          </a:xfrm>
+          <a:prstGeom prst="rect">
+            <a:avLst/>
+          </a:prstGeom>
+          <a:noFill/>
+        </p:spPr>
+        <p:txBody>
+          <a:bodyPr wrap="square" rtlCol="0">
+            <a:spAutoFit/>
+          </a:bodyPr>
+          <a:lstStyle/>
+          <a:p>
+            <a:pPr algn="ctr"/>
+            <a:r>
+              <a:rPr lang="en-US" dirty="0" smtClean="0"/>
+              <a:t>EPINIONS _NUM OF </a:t>
+            </a:r>
+            <a:r>
+              <a:rPr lang="en-US" dirty="0" smtClean="0"/>
+              <a:t>DEST</a:t>
+            </a:r>
+            <a:endParaRPr lang="en-US" dirty="0"/>
+          </a:p>
+        </p:txBody>
+      </p:sp>
+    </p:spTree>
+  </p:cSld>
+  <p:clrMapOvr>
+    <a:masterClrMapping/>
+  </p:clrMapOvr>
+</p:sld>
+</file>
+
+<file path=ppt/slides/slide18.xml><?xml version="1.0" encoding="utf-8"?>
+<p:sld xmlns:a="http://schemas.openxmlformats.org/drawingml/2006/main" xmlns:r="http://schemas.openxmlformats.org/officeDocument/2006/relationships" xmlns:p="http://schemas.openxmlformats.org/presentationml/2006/main">
+  <p:cSld>
+    <p:spTree>
+      <p:nvGrpSpPr>
+        <p:cNvPr id="1" name=""/>
+        <p:cNvGrpSpPr/>
+        <p:nvPr/>
+      </p:nvGrpSpPr>
+      <p:grpSpPr>
+        <a:xfrm>
+          <a:off x="0" y="0"/>
+          <a:ext cx="0" cy="0"/>
+          <a:chOff x="0" y="0"/>
+          <a:chExt cx="0" cy="0"/>
+        </a:xfrm>
+      </p:grpSpPr>
+      <p:pic>
+        <p:nvPicPr>
+          <p:cNvPr id="2" name="Picture 1" descr="epinions_num_src_filtered.png"/>
+          <p:cNvPicPr>
+            <a:picLocks noChangeAspect="1"/>
+          </p:cNvPicPr>
+          <p:nvPr/>
+        </p:nvPicPr>
+        <p:blipFill>
+          <a:blip r:embed="rId2"/>
+          <a:stretch>
+            <a:fillRect/>
+          </a:stretch>
+        </p:blipFill>
+        <p:spPr>
+          <a:xfrm>
+            <a:off x="391884" y="0"/>
+            <a:ext cx="10947977" cy="5120640"/>
+          </a:xfrm>
+          <a:prstGeom prst="rect">
+            <a:avLst/>
+          </a:prstGeom>
+        </p:spPr>
+      </p:pic>
+      <p:sp>
+        <p:nvSpPr>
+          <p:cNvPr id="3" name="TextBox 2"/>
+          <p:cNvSpPr txBox="1"/>
+          <p:nvPr/>
+        </p:nvSpPr>
+        <p:spPr>
+          <a:xfrm>
+            <a:off x="1920240" y="5525589"/>
+            <a:ext cx="8948057" cy="369332"/>
+          </a:xfrm>
+          <a:prstGeom prst="rect">
+            <a:avLst/>
+          </a:prstGeom>
+          <a:noFill/>
+        </p:spPr>
+        <p:txBody>
+          <a:bodyPr wrap="square" rtlCol="0">
+            <a:spAutoFit/>
+          </a:bodyPr>
+          <a:lstStyle/>
+          <a:p>
+            <a:pPr algn="ctr"/>
+            <a:r>
+              <a:rPr lang="en-US" dirty="0" smtClean="0"/>
+              <a:t>EPINIONS _NUM OF </a:t>
+            </a:r>
+            <a:r>
+              <a:rPr lang="en-US" dirty="0" smtClean="0"/>
+              <a:t>SRC </a:t>
+            </a:r>
+            <a:r>
+              <a:rPr lang="en-US" dirty="0" smtClean="0"/>
+              <a:t>FILTERED FROM GT</a:t>
+            </a:r>
+            <a:endParaRPr lang="en-US" dirty="0"/>
+          </a:p>
+        </p:txBody>
+      </p:sp>
+    </p:spTree>
+  </p:cSld>
+  <p:clrMapOvr>
+    <a:masterClrMapping/>
+  </p:clrMapOvr>
+</p:sld>
+</file>
+
+<file path=ppt/slides/slide19.xml><?xml version="1.0" encoding="utf-8"?>
+<p:sld xmlns:a="http://schemas.openxmlformats.org/drawingml/2006/main" xmlns:r="http://schemas.openxmlformats.org/officeDocument/2006/relationships" xmlns:p="http://schemas.openxmlformats.org/presentationml/2006/main">
+  <p:cSld>
+    <p:spTree>
+      <p:nvGrpSpPr>
+        <p:cNvPr id="1" name=""/>
+        <p:cNvGrpSpPr/>
+        <p:nvPr/>
+      </p:nvGrpSpPr>
+      <p:grpSpPr>
+        <a:xfrm>
+          <a:off x="0" y="0"/>
+          <a:ext cx="0" cy="0"/>
+          <a:chOff x="0" y="0"/>
+          <a:chExt cx="0" cy="0"/>
+        </a:xfrm>
+      </p:grpSpPr>
+      <p:pic>
+        <p:nvPicPr>
+          <p:cNvPr id="2" name="Picture 1" descr="epinions_num_dest_filtered.png"/>
+          <p:cNvPicPr>
+            <a:picLocks noChangeAspect="1"/>
+          </p:cNvPicPr>
+          <p:nvPr/>
+        </p:nvPicPr>
+        <p:blipFill>
+          <a:blip r:embed="rId2"/>
+          <a:stretch>
+            <a:fillRect/>
+          </a:stretch>
+        </p:blipFill>
+        <p:spPr>
+          <a:xfrm>
+            <a:off x="1724296" y="95149"/>
+            <a:ext cx="8961121" cy="5006386"/>
+          </a:xfrm>
+          <a:prstGeom prst="rect">
+            <a:avLst/>
+          </a:prstGeom>
+        </p:spPr>
+      </p:pic>
+      <p:sp>
+        <p:nvSpPr>
+          <p:cNvPr id="3" name="TextBox 2"/>
+          <p:cNvSpPr txBox="1"/>
+          <p:nvPr/>
+        </p:nvSpPr>
+        <p:spPr>
+          <a:xfrm>
+            <a:off x="2259875" y="5904411"/>
+            <a:ext cx="8294914" cy="369332"/>
+          </a:xfrm>
+          <a:prstGeom prst="rect">
+            <a:avLst/>
+          </a:prstGeom>
+          <a:noFill/>
+        </p:spPr>
+        <p:txBody>
+          <a:bodyPr wrap="square" rtlCol="0">
+            <a:spAutoFit/>
+          </a:bodyPr>
+          <a:lstStyle/>
+          <a:p>
+            <a:pPr algn="ctr"/>
+            <a:r>
+              <a:rPr lang="en-US" dirty="0" smtClean="0"/>
+              <a:t>EPINIONS _NUM OF DEST FILTERED FROM GT</a:t>
+            </a:r>
+            <a:endParaRPr lang="en-US" dirty="0"/>
+          </a:p>
+        </p:txBody>
+      </p:sp>
+    </p:spTree>
   </p:cSld>
   <p:clrMapOvr>
     <a:masterClrMapping/>
@@ -3362,7 +4242,7 @@
           <p:cNvPr id="2" name="Table 2">
             <a:extLst>
               <a:ext uri="{FF2B5EF4-FFF2-40B4-BE49-F238E27FC236}">
-                <a16:creationId xmlns="" xmlns:a16="http://schemas.microsoft.com/office/drawing/2014/main" id="{942DC4F7-AE6D-453C-97C6-E720F0A23664}"/>
+                <a16:creationId xmlns:a16="http://schemas.microsoft.com/office/drawing/2014/main" xmlns="" id="{942DC4F7-AE6D-453C-97C6-E720F0A23664}"/>
               </a:ext>
             </a:extLst>
           </p:cNvPr>
@@ -3372,7 +4252,7 @@
           <p:nvPr>
             <p:extLst>
               <p:ext uri="{D42A27DB-BD31-4B8C-83A1-F6EECF244321}">
-                <p14:modId xmlns="" xmlns:p14="http://schemas.microsoft.com/office/powerpoint/2010/main" val="2014294081"/>
+                <p14:modId xmlns:p14="http://schemas.microsoft.com/office/powerpoint/2010/main" xmlns="" val="2014294081"/>
               </p:ext>
             </p:extLst>
           </p:nvPr>
@@ -3391,70 +4271,70 @@
                 <a:gridCol w="1201017">
                   <a:extLst>
                     <a:ext uri="{9D8B030D-6E8A-4147-A177-3AD203B41FA5}">
-                      <a16:colId xmlns="" xmlns:a16="http://schemas.microsoft.com/office/drawing/2014/main" val="396718428"/>
+                      <a16:colId xmlns:a16="http://schemas.microsoft.com/office/drawing/2014/main" xmlns="" val="396718428"/>
                     </a:ext>
                   </a:extLst>
                 </a:gridCol>
                 <a:gridCol w="1201017">
                   <a:extLst>
                     <a:ext uri="{9D8B030D-6E8A-4147-A177-3AD203B41FA5}">
-                      <a16:colId xmlns="" xmlns:a16="http://schemas.microsoft.com/office/drawing/2014/main" val="1816111099"/>
+                      <a16:colId xmlns:a16="http://schemas.microsoft.com/office/drawing/2014/main" xmlns="" val="1816111099"/>
                     </a:ext>
                   </a:extLst>
                 </a:gridCol>
                 <a:gridCol w="1201017">
                   <a:extLst>
                     <a:ext uri="{9D8B030D-6E8A-4147-A177-3AD203B41FA5}">
-                      <a16:colId xmlns="" xmlns:a16="http://schemas.microsoft.com/office/drawing/2014/main" val="3868045922"/>
+                      <a16:colId xmlns:a16="http://schemas.microsoft.com/office/drawing/2014/main" xmlns="" val="3868045922"/>
                     </a:ext>
                   </a:extLst>
                 </a:gridCol>
                 <a:gridCol w="1201017">
                   <a:extLst>
                     <a:ext uri="{9D8B030D-6E8A-4147-A177-3AD203B41FA5}">
-                      <a16:colId xmlns="" xmlns:a16="http://schemas.microsoft.com/office/drawing/2014/main" val="1407171677"/>
+                      <a16:colId xmlns:a16="http://schemas.microsoft.com/office/drawing/2014/main" xmlns="" val="1407171677"/>
                     </a:ext>
                   </a:extLst>
                 </a:gridCol>
                 <a:gridCol w="1201017">
                   <a:extLst>
                     <a:ext uri="{9D8B030D-6E8A-4147-A177-3AD203B41FA5}">
-                      <a16:colId xmlns="" xmlns:a16="http://schemas.microsoft.com/office/drawing/2014/main" val="2070003332"/>
+                      <a16:colId xmlns:a16="http://schemas.microsoft.com/office/drawing/2014/main" xmlns="" val="2070003332"/>
                     </a:ext>
                   </a:extLst>
                 </a:gridCol>
                 <a:gridCol w="1201017">
                   <a:extLst>
                     <a:ext uri="{9D8B030D-6E8A-4147-A177-3AD203B41FA5}">
-                      <a16:colId xmlns="" xmlns:a16="http://schemas.microsoft.com/office/drawing/2014/main" val="1239300607"/>
+                      <a16:colId xmlns:a16="http://schemas.microsoft.com/office/drawing/2014/main" xmlns="" val="1239300607"/>
                     </a:ext>
                   </a:extLst>
                 </a:gridCol>
                 <a:gridCol w="1201017">
                   <a:extLst>
                     <a:ext uri="{9D8B030D-6E8A-4147-A177-3AD203B41FA5}">
-                      <a16:colId xmlns="" xmlns:a16="http://schemas.microsoft.com/office/drawing/2014/main" val="729143588"/>
+                      <a16:colId xmlns:a16="http://schemas.microsoft.com/office/drawing/2014/main" xmlns="" val="729143588"/>
                     </a:ext>
                   </a:extLst>
                 </a:gridCol>
                 <a:gridCol w="1201017">
                   <a:extLst>
                     <a:ext uri="{9D8B030D-6E8A-4147-A177-3AD203B41FA5}">
-                      <a16:colId xmlns="" xmlns:a16="http://schemas.microsoft.com/office/drawing/2014/main" val="3670628200"/>
+                      <a16:colId xmlns:a16="http://schemas.microsoft.com/office/drawing/2014/main" xmlns="" val="3670628200"/>
                     </a:ext>
                   </a:extLst>
                 </a:gridCol>
                 <a:gridCol w="1201017">
                   <a:extLst>
                     <a:ext uri="{9D8B030D-6E8A-4147-A177-3AD203B41FA5}">
-                      <a16:colId xmlns="" xmlns:a16="http://schemas.microsoft.com/office/drawing/2014/main" val="580367077"/>
+                      <a16:colId xmlns:a16="http://schemas.microsoft.com/office/drawing/2014/main" xmlns="" val="580367077"/>
                     </a:ext>
                   </a:extLst>
                 </a:gridCol>
                 <a:gridCol w="1201017">
                   <a:extLst>
                     <a:ext uri="{9D8B030D-6E8A-4147-A177-3AD203B41FA5}">
-                      <a16:colId xmlns="" xmlns:a16="http://schemas.microsoft.com/office/drawing/2014/main" val="726183018"/>
+                      <a16:colId xmlns:a16="http://schemas.microsoft.com/office/drawing/2014/main" xmlns="" val="726183018"/>
                     </a:ext>
                   </a:extLst>
                 </a:gridCol>
@@ -3598,7 +4478,7 @@
                 </a:tc>
                 <a:extLst>
                   <a:ext uri="{0D108BD9-81ED-4DB2-BD59-A6C34878D82A}">
-                    <a16:rowId xmlns="" xmlns:a16="http://schemas.microsoft.com/office/drawing/2014/main" val="1182983052"/>
+                    <a16:rowId xmlns:a16="http://schemas.microsoft.com/office/drawing/2014/main" xmlns="" val="1182983052"/>
                   </a:ext>
                 </a:extLst>
               </a:tr>
@@ -3781,7 +4661,7 @@
                 </a:tc>
                 <a:extLst>
                   <a:ext uri="{0D108BD9-81ED-4DB2-BD59-A6C34878D82A}">
-                    <a16:rowId xmlns="" xmlns:a16="http://schemas.microsoft.com/office/drawing/2014/main" val="1640636793"/>
+                    <a16:rowId xmlns:a16="http://schemas.microsoft.com/office/drawing/2014/main" xmlns="" val="1640636793"/>
                   </a:ext>
                 </a:extLst>
               </a:tr>
@@ -3946,7 +4826,7 @@
                 </a:tc>
                 <a:extLst>
                   <a:ext uri="{0D108BD9-81ED-4DB2-BD59-A6C34878D82A}">
-                    <a16:rowId xmlns="" xmlns:a16="http://schemas.microsoft.com/office/drawing/2014/main" val="1069655678"/>
+                    <a16:rowId xmlns:a16="http://schemas.microsoft.com/office/drawing/2014/main" xmlns="" val="1069655678"/>
                   </a:ext>
                 </a:extLst>
               </a:tr>
@@ -4092,7 +4972,7 @@
                 </a:tc>
                 <a:extLst>
                   <a:ext uri="{0D108BD9-81ED-4DB2-BD59-A6C34878D82A}">
-                    <a16:rowId xmlns="" xmlns:a16="http://schemas.microsoft.com/office/drawing/2014/main" val="3150364866"/>
+                    <a16:rowId xmlns:a16="http://schemas.microsoft.com/office/drawing/2014/main" xmlns="" val="3150364866"/>
                   </a:ext>
                 </a:extLst>
               </a:tr>
@@ -4229,7 +5109,7 @@
                 </a:tc>
                 <a:extLst>
                   <a:ext uri="{0D108BD9-81ED-4DB2-BD59-A6C34878D82A}">
-                    <a16:rowId xmlns="" xmlns:a16="http://schemas.microsoft.com/office/drawing/2014/main" val="1465012615"/>
+                    <a16:rowId xmlns:a16="http://schemas.microsoft.com/office/drawing/2014/main" xmlns="" val="1465012615"/>
                   </a:ext>
                 </a:extLst>
               </a:tr>
@@ -4240,7 +5120,7 @@
     </p:spTree>
     <p:extLst>
       <p:ext uri="{BB962C8B-B14F-4D97-AF65-F5344CB8AC3E}">
-        <p14:creationId xmlns="" xmlns:p14="http://schemas.microsoft.com/office/powerpoint/2010/main" val="334262846"/>
+        <p14:creationId xmlns:p14="http://schemas.microsoft.com/office/powerpoint/2010/main" xmlns="" val="334262846"/>
       </p:ext>
     </p:extLst>
   </p:cSld>
@@ -4272,7 +5152,7 @@
           <p:cNvPr id="3" name="Table 3">
             <a:extLst>
               <a:ext uri="{FF2B5EF4-FFF2-40B4-BE49-F238E27FC236}">
-                <a16:creationId xmlns="" xmlns:a16="http://schemas.microsoft.com/office/drawing/2014/main" id="{C7A511F9-D817-4B1B-A3B7-751BB6B55705}"/>
+                <a16:creationId xmlns:a16="http://schemas.microsoft.com/office/drawing/2014/main" xmlns="" id="{C7A511F9-D817-4B1B-A3B7-751BB6B55705}"/>
               </a:ext>
             </a:extLst>
           </p:cNvPr>
@@ -4282,7 +5162,7 @@
           <p:nvPr>
             <p:extLst>
               <p:ext uri="{D42A27DB-BD31-4B8C-83A1-F6EECF244321}">
-                <p14:modId xmlns="" xmlns:p14="http://schemas.microsoft.com/office/powerpoint/2010/main" val="2848685212"/>
+                <p14:modId xmlns:p14="http://schemas.microsoft.com/office/powerpoint/2010/main" xmlns="" val="2848685212"/>
               </p:ext>
             </p:extLst>
           </p:nvPr>
@@ -4301,42 +5181,42 @@
                 <a:gridCol w="1895792">
                   <a:extLst>
                     <a:ext uri="{9D8B030D-6E8A-4147-A177-3AD203B41FA5}">
-                      <a16:colId xmlns="" xmlns:a16="http://schemas.microsoft.com/office/drawing/2014/main" val="2630670175"/>
+                      <a16:colId xmlns:a16="http://schemas.microsoft.com/office/drawing/2014/main" xmlns="" val="2630670175"/>
                     </a:ext>
                   </a:extLst>
                 </a:gridCol>
                 <a:gridCol w="1895792">
                   <a:extLst>
                     <a:ext uri="{9D8B030D-6E8A-4147-A177-3AD203B41FA5}">
-                      <a16:colId xmlns="" xmlns:a16="http://schemas.microsoft.com/office/drawing/2014/main" val="2770404781"/>
+                      <a16:colId xmlns:a16="http://schemas.microsoft.com/office/drawing/2014/main" xmlns="" val="2770404781"/>
                     </a:ext>
                   </a:extLst>
                 </a:gridCol>
                 <a:gridCol w="1895792">
                   <a:extLst>
                     <a:ext uri="{9D8B030D-6E8A-4147-A177-3AD203B41FA5}">
-                      <a16:colId xmlns="" xmlns:a16="http://schemas.microsoft.com/office/drawing/2014/main" val="3006019617"/>
+                      <a16:colId xmlns:a16="http://schemas.microsoft.com/office/drawing/2014/main" xmlns="" val="3006019617"/>
                     </a:ext>
                   </a:extLst>
                 </a:gridCol>
                 <a:gridCol w="1895792">
                   <a:extLst>
                     <a:ext uri="{9D8B030D-6E8A-4147-A177-3AD203B41FA5}">
-                      <a16:colId xmlns="" xmlns:a16="http://schemas.microsoft.com/office/drawing/2014/main" val="86412324"/>
+                      <a16:colId xmlns:a16="http://schemas.microsoft.com/office/drawing/2014/main" xmlns="" val="86412324"/>
                     </a:ext>
                   </a:extLst>
                 </a:gridCol>
                 <a:gridCol w="1895792">
                   <a:extLst>
                     <a:ext uri="{9D8B030D-6E8A-4147-A177-3AD203B41FA5}">
-                      <a16:colId xmlns="" xmlns:a16="http://schemas.microsoft.com/office/drawing/2014/main" val="1196321579"/>
+                      <a16:colId xmlns:a16="http://schemas.microsoft.com/office/drawing/2014/main" xmlns="" val="1196321579"/>
                     </a:ext>
                   </a:extLst>
                 </a:gridCol>
                 <a:gridCol w="1895792">
                   <a:extLst>
                     <a:ext uri="{9D8B030D-6E8A-4147-A177-3AD203B41FA5}">
-                      <a16:colId xmlns="" xmlns:a16="http://schemas.microsoft.com/office/drawing/2014/main" val="3601882656"/>
+                      <a16:colId xmlns:a16="http://schemas.microsoft.com/office/drawing/2014/main" xmlns="" val="3601882656"/>
                     </a:ext>
                   </a:extLst>
                 </a:gridCol>
@@ -4419,7 +5299,7 @@
                 </a:tc>
                 <a:extLst>
                   <a:ext uri="{0D108BD9-81ED-4DB2-BD59-A6C34878D82A}">
-                    <a16:rowId xmlns="" xmlns:a16="http://schemas.microsoft.com/office/drawing/2014/main" val="1153796569"/>
+                    <a16:rowId xmlns:a16="http://schemas.microsoft.com/office/drawing/2014/main" xmlns="" val="1153796569"/>
                   </a:ext>
                 </a:extLst>
               </a:tr>
@@ -4506,7 +5386,7 @@
                 </a:tc>
                 <a:extLst>
                   <a:ext uri="{0D108BD9-81ED-4DB2-BD59-A6C34878D82A}">
-                    <a16:rowId xmlns="" xmlns:a16="http://schemas.microsoft.com/office/drawing/2014/main" val="3423383714"/>
+                    <a16:rowId xmlns:a16="http://schemas.microsoft.com/office/drawing/2014/main" xmlns="" val="3423383714"/>
                   </a:ext>
                 </a:extLst>
               </a:tr>
@@ -4593,7 +5473,7 @@
                 </a:tc>
                 <a:extLst>
                   <a:ext uri="{0D108BD9-81ED-4DB2-BD59-A6C34878D82A}">
-                    <a16:rowId xmlns="" xmlns:a16="http://schemas.microsoft.com/office/drawing/2014/main" val="948950892"/>
+                    <a16:rowId xmlns:a16="http://schemas.microsoft.com/office/drawing/2014/main" xmlns="" val="948950892"/>
                   </a:ext>
                 </a:extLst>
               </a:tr>
@@ -4681,7 +5561,7 @@
                 </a:tc>
                 <a:extLst>
                   <a:ext uri="{0D108BD9-81ED-4DB2-BD59-A6C34878D82A}">
-                    <a16:rowId xmlns="" xmlns:a16="http://schemas.microsoft.com/office/drawing/2014/main" val="2575250179"/>
+                    <a16:rowId xmlns:a16="http://schemas.microsoft.com/office/drawing/2014/main" xmlns="" val="2575250179"/>
                   </a:ext>
                 </a:extLst>
               </a:tr>
@@ -4768,7 +5648,7 @@
                 </a:tc>
                 <a:extLst>
                   <a:ext uri="{0D108BD9-81ED-4DB2-BD59-A6C34878D82A}">
-                    <a16:rowId xmlns="" xmlns:a16="http://schemas.microsoft.com/office/drawing/2014/main" val="854959591"/>
+                    <a16:rowId xmlns:a16="http://schemas.microsoft.com/office/drawing/2014/main" xmlns="" val="854959591"/>
                   </a:ext>
                 </a:extLst>
               </a:tr>
@@ -4779,9 +5659,521 @@
     </p:spTree>
     <p:extLst>
       <p:ext uri="{BB962C8B-B14F-4D97-AF65-F5344CB8AC3E}">
-        <p14:creationId xmlns="" xmlns:p14="http://schemas.microsoft.com/office/powerpoint/2010/main" val="2977128826"/>
+        <p14:creationId xmlns:p14="http://schemas.microsoft.com/office/powerpoint/2010/main" xmlns="" val="2977128826"/>
       </p:ext>
     </p:extLst>
+  </p:cSld>
+  <p:clrMapOvr>
+    <a:masterClrMapping/>
+  </p:clrMapOvr>
+</p:sld>
+</file>
+
+<file path=ppt/slides/slide4.xml><?xml version="1.0" encoding="utf-8"?>
+<p:sld xmlns:a="http://schemas.openxmlformats.org/drawingml/2006/main" xmlns:r="http://schemas.openxmlformats.org/officeDocument/2006/relationships" xmlns:p="http://schemas.openxmlformats.org/presentationml/2006/main">
+  <p:cSld>
+    <p:spTree>
+      <p:nvGrpSpPr>
+        <p:cNvPr id="1" name=""/>
+        <p:cNvGrpSpPr/>
+        <p:nvPr/>
+      </p:nvGrpSpPr>
+      <p:grpSpPr>
+        <a:xfrm>
+          <a:off x="0" y="0"/>
+          <a:ext cx="0" cy="0"/>
+          <a:chOff x="0" y="0"/>
+          <a:chExt cx="0" cy="0"/>
+        </a:xfrm>
+      </p:grpSpPr>
+      <p:pic>
+        <p:nvPicPr>
+          <p:cNvPr id="2" name="Picture 1" descr="alpha_num_src.png"/>
+          <p:cNvPicPr>
+            <a:picLocks noChangeAspect="1"/>
+          </p:cNvPicPr>
+          <p:nvPr/>
+        </p:nvPicPr>
+        <p:blipFill>
+          <a:blip r:embed="rId2"/>
+          <a:stretch>
+            <a:fillRect/>
+          </a:stretch>
+        </p:blipFill>
+        <p:spPr>
+          <a:xfrm>
+            <a:off x="1998617" y="0"/>
+            <a:ext cx="8294914" cy="5329376"/>
+          </a:xfrm>
+          <a:prstGeom prst="rect">
+            <a:avLst/>
+          </a:prstGeom>
+        </p:spPr>
+      </p:pic>
+      <p:sp>
+        <p:nvSpPr>
+          <p:cNvPr id="3" name="TextBox 2"/>
+          <p:cNvSpPr txBox="1"/>
+          <p:nvPr/>
+        </p:nvSpPr>
+        <p:spPr>
+          <a:xfrm>
+            <a:off x="2220686" y="5982789"/>
+            <a:ext cx="8085908" cy="369332"/>
+          </a:xfrm>
+          <a:prstGeom prst="rect">
+            <a:avLst/>
+          </a:prstGeom>
+          <a:noFill/>
+        </p:spPr>
+        <p:txBody>
+          <a:bodyPr wrap="square" rtlCol="0">
+            <a:spAutoFit/>
+          </a:bodyPr>
+          <a:lstStyle/>
+          <a:p>
+            <a:pPr algn="ctr"/>
+            <a:r>
+              <a:rPr lang="en-US" dirty="0" smtClean="0"/>
+              <a:t>ALPHA_NUM OF </a:t>
+            </a:r>
+            <a:r>
+              <a:rPr lang="en-US" dirty="0" smtClean="0"/>
+              <a:t>SRC</a:t>
+            </a:r>
+            <a:endParaRPr lang="en-US" dirty="0" smtClean="0"/>
+          </a:p>
+        </p:txBody>
+      </p:sp>
+    </p:spTree>
+  </p:cSld>
+  <p:clrMapOvr>
+    <a:masterClrMapping/>
+  </p:clrMapOvr>
+</p:sld>
+</file>
+
+<file path=ppt/slides/slide5.xml><?xml version="1.0" encoding="utf-8"?>
+<p:sld xmlns:a="http://schemas.openxmlformats.org/drawingml/2006/main" xmlns:r="http://schemas.openxmlformats.org/officeDocument/2006/relationships" xmlns:p="http://schemas.openxmlformats.org/presentationml/2006/main">
+  <p:cSld>
+    <p:spTree>
+      <p:nvGrpSpPr>
+        <p:cNvPr id="1" name=""/>
+        <p:cNvGrpSpPr/>
+        <p:nvPr/>
+      </p:nvGrpSpPr>
+      <p:grpSpPr>
+        <a:xfrm>
+          <a:off x="0" y="0"/>
+          <a:ext cx="0" cy="0"/>
+          <a:chOff x="0" y="0"/>
+          <a:chExt cx="0" cy="0"/>
+        </a:xfrm>
+      </p:grpSpPr>
+      <p:pic>
+        <p:nvPicPr>
+          <p:cNvPr id="2" name="Picture 1" descr="alpha_num_dest.png"/>
+          <p:cNvPicPr>
+            <a:picLocks noChangeAspect="1"/>
+          </p:cNvPicPr>
+          <p:nvPr/>
+        </p:nvPicPr>
+        <p:blipFill>
+          <a:blip r:embed="rId2"/>
+          <a:stretch>
+            <a:fillRect/>
+          </a:stretch>
+        </p:blipFill>
+        <p:spPr>
+          <a:xfrm>
+            <a:off x="1795740" y="0"/>
+            <a:ext cx="8510854" cy="5468114"/>
+          </a:xfrm>
+          <a:prstGeom prst="rect">
+            <a:avLst/>
+          </a:prstGeom>
+        </p:spPr>
+      </p:pic>
+      <p:sp>
+        <p:nvSpPr>
+          <p:cNvPr id="3" name="TextBox 2"/>
+          <p:cNvSpPr txBox="1"/>
+          <p:nvPr/>
+        </p:nvSpPr>
+        <p:spPr>
+          <a:xfrm>
+            <a:off x="2024743" y="6113417"/>
+            <a:ext cx="8595360" cy="369332"/>
+          </a:xfrm>
+          <a:prstGeom prst="rect">
+            <a:avLst/>
+          </a:prstGeom>
+          <a:noFill/>
+        </p:spPr>
+        <p:txBody>
+          <a:bodyPr wrap="square" rtlCol="0">
+            <a:spAutoFit/>
+          </a:bodyPr>
+          <a:lstStyle/>
+          <a:p>
+            <a:pPr algn="ctr"/>
+            <a:r>
+              <a:rPr lang="en-US" dirty="0" smtClean="0"/>
+              <a:t>ALPHA_NUM OF </a:t>
+            </a:r>
+            <a:r>
+              <a:rPr lang="en-US" dirty="0" smtClean="0"/>
+              <a:t>DEST</a:t>
+            </a:r>
+            <a:endParaRPr lang="en-US" dirty="0" smtClean="0"/>
+          </a:p>
+        </p:txBody>
+      </p:sp>
+    </p:spTree>
+  </p:cSld>
+  <p:clrMapOvr>
+    <a:masterClrMapping/>
+  </p:clrMapOvr>
+</p:sld>
+</file>
+
+<file path=ppt/slides/slide6.xml><?xml version="1.0" encoding="utf-8"?>
+<p:sld xmlns:a="http://schemas.openxmlformats.org/drawingml/2006/main" xmlns:r="http://schemas.openxmlformats.org/officeDocument/2006/relationships" xmlns:p="http://schemas.openxmlformats.org/presentationml/2006/main">
+  <p:cSld>
+    <p:spTree>
+      <p:nvGrpSpPr>
+        <p:cNvPr id="1" name=""/>
+        <p:cNvGrpSpPr/>
+        <p:nvPr/>
+      </p:nvGrpSpPr>
+      <p:grpSpPr>
+        <a:xfrm>
+          <a:off x="0" y="0"/>
+          <a:ext cx="0" cy="0"/>
+          <a:chOff x="0" y="0"/>
+          <a:chExt cx="0" cy="0"/>
+        </a:xfrm>
+      </p:grpSpPr>
+      <p:pic>
+        <p:nvPicPr>
+          <p:cNvPr id="2" name="Picture 1" descr="alpha_num_src_filtered.png"/>
+          <p:cNvPicPr>
+            <a:picLocks noChangeAspect="1"/>
+          </p:cNvPicPr>
+          <p:nvPr/>
+        </p:nvPicPr>
+        <p:blipFill>
+          <a:blip r:embed="rId2"/>
+          <a:stretch>
+            <a:fillRect/>
+          </a:stretch>
+        </p:blipFill>
+        <p:spPr>
+          <a:xfrm>
+            <a:off x="2037806" y="0"/>
+            <a:ext cx="8921931" cy="5113860"/>
+          </a:xfrm>
+          <a:prstGeom prst="rect">
+            <a:avLst/>
+          </a:prstGeom>
+        </p:spPr>
+      </p:pic>
+      <p:sp>
+        <p:nvSpPr>
+          <p:cNvPr id="3" name="TextBox 2"/>
+          <p:cNvSpPr txBox="1"/>
+          <p:nvPr/>
+        </p:nvSpPr>
+        <p:spPr>
+          <a:xfrm>
+            <a:off x="1802674" y="5799909"/>
+            <a:ext cx="9418320" cy="369332"/>
+          </a:xfrm>
+          <a:prstGeom prst="rect">
+            <a:avLst/>
+          </a:prstGeom>
+          <a:noFill/>
+        </p:spPr>
+        <p:txBody>
+          <a:bodyPr wrap="square" rtlCol="0">
+            <a:spAutoFit/>
+          </a:bodyPr>
+          <a:lstStyle/>
+          <a:p>
+            <a:pPr algn="ctr"/>
+            <a:r>
+              <a:rPr lang="en-US" dirty="0" smtClean="0"/>
+              <a:t>ALPHA_NUM OF </a:t>
+            </a:r>
+            <a:r>
+              <a:rPr lang="en-US" dirty="0" smtClean="0"/>
+              <a:t>SRC </a:t>
+            </a:r>
+            <a:r>
+              <a:rPr lang="en-US" dirty="0" smtClean="0"/>
+              <a:t>FILTERED FROM </a:t>
+            </a:r>
+            <a:r>
+              <a:rPr lang="en-US" dirty="0" smtClean="0"/>
+              <a:t>GT</a:t>
+            </a:r>
+            <a:endParaRPr lang="en-US" dirty="0" smtClean="0"/>
+          </a:p>
+        </p:txBody>
+      </p:sp>
+    </p:spTree>
+  </p:cSld>
+  <p:clrMapOvr>
+    <a:masterClrMapping/>
+  </p:clrMapOvr>
+</p:sld>
+</file>
+
+<file path=ppt/slides/slide7.xml><?xml version="1.0" encoding="utf-8"?>
+<p:sld xmlns:a="http://schemas.openxmlformats.org/drawingml/2006/main" xmlns:r="http://schemas.openxmlformats.org/officeDocument/2006/relationships" xmlns:p="http://schemas.openxmlformats.org/presentationml/2006/main">
+  <p:cSld>
+    <p:spTree>
+      <p:nvGrpSpPr>
+        <p:cNvPr id="1" name=""/>
+        <p:cNvGrpSpPr/>
+        <p:nvPr/>
+      </p:nvGrpSpPr>
+      <p:grpSpPr>
+        <a:xfrm>
+          <a:off x="0" y="0"/>
+          <a:ext cx="0" cy="0"/>
+          <a:chOff x="0" y="0"/>
+          <a:chExt cx="0" cy="0"/>
+        </a:xfrm>
+      </p:grpSpPr>
+      <p:pic>
+        <p:nvPicPr>
+          <p:cNvPr id="2" name="Picture 1" descr="alpha_num_dest_filtered.png"/>
+          <p:cNvPicPr>
+            <a:picLocks noChangeAspect="1"/>
+          </p:cNvPicPr>
+          <p:nvPr/>
+        </p:nvPicPr>
+        <p:blipFill>
+          <a:blip r:embed="rId2"/>
+          <a:stretch>
+            <a:fillRect/>
+          </a:stretch>
+        </p:blipFill>
+        <p:spPr>
+          <a:xfrm>
+            <a:off x="2114936" y="-1"/>
+            <a:ext cx="8583544" cy="5094515"/>
+          </a:xfrm>
+          <a:prstGeom prst="rect">
+            <a:avLst/>
+          </a:prstGeom>
+        </p:spPr>
+      </p:pic>
+      <p:sp>
+        <p:nvSpPr>
+          <p:cNvPr id="3" name="TextBox 2"/>
+          <p:cNvSpPr txBox="1"/>
+          <p:nvPr/>
+        </p:nvSpPr>
+        <p:spPr>
+          <a:xfrm>
+            <a:off x="2181497" y="5930537"/>
+            <a:ext cx="8360229" cy="369332"/>
+          </a:xfrm>
+          <a:prstGeom prst="rect">
+            <a:avLst/>
+          </a:prstGeom>
+          <a:noFill/>
+        </p:spPr>
+        <p:txBody>
+          <a:bodyPr wrap="square" rtlCol="0">
+            <a:spAutoFit/>
+          </a:bodyPr>
+          <a:lstStyle/>
+          <a:p>
+            <a:pPr algn="ctr"/>
+            <a:r>
+              <a:rPr lang="en-US" dirty="0" smtClean="0"/>
+              <a:t>ALPHA_NUM </a:t>
+            </a:r>
+            <a:r>
+              <a:rPr lang="en-US" dirty="0" smtClean="0"/>
+              <a:t>OF DEST FILTERED FROM </a:t>
+            </a:r>
+            <a:r>
+              <a:rPr lang="en-US" dirty="0" smtClean="0"/>
+              <a:t>GT</a:t>
+            </a:r>
+            <a:endParaRPr lang="en-US" dirty="0" smtClean="0"/>
+          </a:p>
+        </p:txBody>
+      </p:sp>
+    </p:spTree>
+  </p:cSld>
+  <p:clrMapOvr>
+    <a:masterClrMapping/>
+  </p:clrMapOvr>
+</p:sld>
+</file>
+
+<file path=ppt/slides/slide8.xml><?xml version="1.0" encoding="utf-8"?>
+<p:sld xmlns:a="http://schemas.openxmlformats.org/drawingml/2006/main" xmlns:r="http://schemas.openxmlformats.org/officeDocument/2006/relationships" xmlns:p="http://schemas.openxmlformats.org/presentationml/2006/main">
+  <p:cSld>
+    <p:spTree>
+      <p:nvGrpSpPr>
+        <p:cNvPr id="1" name=""/>
+        <p:cNvGrpSpPr/>
+        <p:nvPr/>
+      </p:nvGrpSpPr>
+      <p:grpSpPr>
+        <a:xfrm>
+          <a:off x="0" y="0"/>
+          <a:ext cx="0" cy="0"/>
+          <a:chOff x="0" y="0"/>
+          <a:chExt cx="0" cy="0"/>
+        </a:xfrm>
+      </p:grpSpPr>
+      <p:pic>
+        <p:nvPicPr>
+          <p:cNvPr id="2" name="Picture 1" descr="otc_num_src.png"/>
+          <p:cNvPicPr>
+            <a:picLocks noChangeAspect="1"/>
+          </p:cNvPicPr>
+          <p:nvPr/>
+        </p:nvPicPr>
+        <p:blipFill>
+          <a:blip r:embed="rId2"/>
+          <a:stretch>
+            <a:fillRect/>
+          </a:stretch>
+        </p:blipFill>
+        <p:spPr>
+          <a:xfrm>
+            <a:off x="1854927" y="-91071"/>
+            <a:ext cx="9065622" cy="5289961"/>
+          </a:xfrm>
+          <a:prstGeom prst="rect">
+            <a:avLst/>
+          </a:prstGeom>
+        </p:spPr>
+      </p:pic>
+      <p:sp>
+        <p:nvSpPr>
+          <p:cNvPr id="3" name="TextBox 2"/>
+          <p:cNvSpPr txBox="1"/>
+          <p:nvPr/>
+        </p:nvSpPr>
+        <p:spPr>
+          <a:xfrm>
+            <a:off x="1567543" y="5904411"/>
+            <a:ext cx="9392194" cy="369332"/>
+          </a:xfrm>
+          <a:prstGeom prst="rect">
+            <a:avLst/>
+          </a:prstGeom>
+          <a:noFill/>
+        </p:spPr>
+        <p:txBody>
+          <a:bodyPr wrap="square" rtlCol="0">
+            <a:spAutoFit/>
+          </a:bodyPr>
+          <a:lstStyle/>
+          <a:p>
+            <a:pPr algn="ctr"/>
+            <a:r>
+              <a:rPr lang="en-US" dirty="0" smtClean="0"/>
+              <a:t>OTC _NUM OF </a:t>
+            </a:r>
+            <a:r>
+              <a:rPr lang="en-US" dirty="0" smtClean="0"/>
+              <a:t>SRC</a:t>
+            </a:r>
+            <a:endParaRPr lang="en-US" dirty="0"/>
+          </a:p>
+        </p:txBody>
+      </p:sp>
+    </p:spTree>
+  </p:cSld>
+  <p:clrMapOvr>
+    <a:masterClrMapping/>
+  </p:clrMapOvr>
+</p:sld>
+</file>
+
+<file path=ppt/slides/slide9.xml><?xml version="1.0" encoding="utf-8"?>
+<p:sld xmlns:a="http://schemas.openxmlformats.org/drawingml/2006/main" xmlns:r="http://schemas.openxmlformats.org/officeDocument/2006/relationships" xmlns:p="http://schemas.openxmlformats.org/presentationml/2006/main">
+  <p:cSld>
+    <p:spTree>
+      <p:nvGrpSpPr>
+        <p:cNvPr id="1" name=""/>
+        <p:cNvGrpSpPr/>
+        <p:nvPr/>
+      </p:nvGrpSpPr>
+      <p:grpSpPr>
+        <a:xfrm>
+          <a:off x="0" y="0"/>
+          <a:ext cx="0" cy="0"/>
+          <a:chOff x="0" y="0"/>
+          <a:chExt cx="0" cy="0"/>
+        </a:xfrm>
+      </p:grpSpPr>
+      <p:pic>
+        <p:nvPicPr>
+          <p:cNvPr id="2" name="Picture 1" descr="otc_num_dest.png"/>
+          <p:cNvPicPr>
+            <a:picLocks noChangeAspect="1"/>
+          </p:cNvPicPr>
+          <p:nvPr/>
+        </p:nvPicPr>
+        <p:blipFill>
+          <a:blip r:embed="rId2"/>
+          <a:stretch>
+            <a:fillRect/>
+          </a:stretch>
+        </p:blipFill>
+        <p:spPr>
+          <a:xfrm>
+            <a:off x="1436914" y="0"/>
+            <a:ext cx="8921932" cy="4987877"/>
+          </a:xfrm>
+          <a:prstGeom prst="rect">
+            <a:avLst/>
+          </a:prstGeom>
+        </p:spPr>
+      </p:pic>
+      <p:sp>
+        <p:nvSpPr>
+          <p:cNvPr id="3" name="TextBox 2"/>
+          <p:cNvSpPr txBox="1"/>
+          <p:nvPr/>
+        </p:nvSpPr>
+        <p:spPr>
+          <a:xfrm>
+            <a:off x="2129246" y="5734595"/>
+            <a:ext cx="8255726" cy="369332"/>
+          </a:xfrm>
+          <a:prstGeom prst="rect">
+            <a:avLst/>
+          </a:prstGeom>
+          <a:noFill/>
+        </p:spPr>
+        <p:txBody>
+          <a:bodyPr wrap="square" rtlCol="0">
+            <a:spAutoFit/>
+          </a:bodyPr>
+          <a:lstStyle/>
+          <a:p>
+            <a:pPr algn="ctr"/>
+            <a:r>
+              <a:rPr lang="en-US" dirty="0" smtClean="0"/>
+              <a:t>OTC _NUM OF DEST </a:t>
+            </a:r>
+            <a:endParaRPr lang="en-US" dirty="0"/>
+          </a:p>
+        </p:txBody>
+      </p:sp>
+    </p:spTree>
   </p:cSld>
   <p:clrMapOvr>
     <a:masterClrMapping/>
@@ -5043,7 +6435,7 @@
   <a:extraClrSchemeLst/>
   <a:extLst>
     <a:ext uri="{05A4C25C-085E-4340-85A3-A5531E510DB2}">
-      <thm15:themeFamily xmlns="" xmlns:thm15="http://schemas.microsoft.com/office/thememl/2012/main" name="Parcel" id="{8BEC4385-4EB9-4D53-BFB5-0EA123736B6D}" vid="{4DB32801-28C0-48B0-8C1D-A9A58613615A}"/>
+      <thm15:themeFamily xmlns:thm15="http://schemas.microsoft.com/office/thememl/2012/main" xmlns="" name="Parcel" id="{8BEC4385-4EB9-4D53-BFB5-0EA123736B6D}" vid="{4DB32801-28C0-48B0-8C1D-A9A58613615A}"/>
     </a:ext>
   </a:extLst>
 </a:theme>

</xml_diff>